<commit_message>
Add icons to be used in VI:s
</commit_message>
<xml_diff>
--- a/docs/Style/Icon Graphics.pptx
+++ b/docs/Style/Icon Graphics.pptx
@@ -104,6 +104,11 @@
       </a:defRPr>
     </a:lvl9pPr>
   </p:defaultTextStyle>
+  <p:extLst>
+    <p:ext uri="{EFAFB233-063F-42B5-8137-9DF3F51BA10A}">
+      <p15:sldGuideLst xmlns:p15="http://schemas.microsoft.com/office/powerpoint/2012/main"/>
+    </p:ext>
+  </p:extLst>
 </p:presentation>
 </file>
 
@@ -256,7 +261,7 @@
           <a:p>
             <a:fld id="{1FA95016-962F-486B-9A5C-BEFA49183FF1}" type="datetimeFigureOut">
               <a:rPr lang="sv-FI" smtClean="0"/>
-              <a:t>31-10-2021</a:t>
+              <a:t>07-12-2021</a:t>
             </a:fld>
             <a:endParaRPr lang="sv-FI"/>
           </a:p>
@@ -456,7 +461,7 @@
           <a:p>
             <a:fld id="{1FA95016-962F-486B-9A5C-BEFA49183FF1}" type="datetimeFigureOut">
               <a:rPr lang="sv-FI" smtClean="0"/>
-              <a:t>31-10-2021</a:t>
+              <a:t>07-12-2021</a:t>
             </a:fld>
             <a:endParaRPr lang="sv-FI"/>
           </a:p>
@@ -666,7 +671,7 @@
           <a:p>
             <a:fld id="{1FA95016-962F-486B-9A5C-BEFA49183FF1}" type="datetimeFigureOut">
               <a:rPr lang="sv-FI" smtClean="0"/>
-              <a:t>31-10-2021</a:t>
+              <a:t>07-12-2021</a:t>
             </a:fld>
             <a:endParaRPr lang="sv-FI"/>
           </a:p>
@@ -866,7 +871,7 @@
           <a:p>
             <a:fld id="{1FA95016-962F-486B-9A5C-BEFA49183FF1}" type="datetimeFigureOut">
               <a:rPr lang="sv-FI" smtClean="0"/>
-              <a:t>31-10-2021</a:t>
+              <a:t>07-12-2021</a:t>
             </a:fld>
             <a:endParaRPr lang="sv-FI"/>
           </a:p>
@@ -1142,7 +1147,7 @@
           <a:p>
             <a:fld id="{1FA95016-962F-486B-9A5C-BEFA49183FF1}" type="datetimeFigureOut">
               <a:rPr lang="sv-FI" smtClean="0"/>
-              <a:t>31-10-2021</a:t>
+              <a:t>07-12-2021</a:t>
             </a:fld>
             <a:endParaRPr lang="sv-FI"/>
           </a:p>
@@ -1410,7 +1415,7 @@
           <a:p>
             <a:fld id="{1FA95016-962F-486B-9A5C-BEFA49183FF1}" type="datetimeFigureOut">
               <a:rPr lang="sv-FI" smtClean="0"/>
-              <a:t>31-10-2021</a:t>
+              <a:t>07-12-2021</a:t>
             </a:fld>
             <a:endParaRPr lang="sv-FI"/>
           </a:p>
@@ -1825,7 +1830,7 @@
           <a:p>
             <a:fld id="{1FA95016-962F-486B-9A5C-BEFA49183FF1}" type="datetimeFigureOut">
               <a:rPr lang="sv-FI" smtClean="0"/>
-              <a:t>31-10-2021</a:t>
+              <a:t>07-12-2021</a:t>
             </a:fld>
             <a:endParaRPr lang="sv-FI"/>
           </a:p>
@@ -1967,7 +1972,7 @@
           <a:p>
             <a:fld id="{1FA95016-962F-486B-9A5C-BEFA49183FF1}" type="datetimeFigureOut">
               <a:rPr lang="sv-FI" smtClean="0"/>
-              <a:t>31-10-2021</a:t>
+              <a:t>07-12-2021</a:t>
             </a:fld>
             <a:endParaRPr lang="sv-FI"/>
           </a:p>
@@ -2080,7 +2085,7 @@
           <a:p>
             <a:fld id="{1FA95016-962F-486B-9A5C-BEFA49183FF1}" type="datetimeFigureOut">
               <a:rPr lang="sv-FI" smtClean="0"/>
-              <a:t>31-10-2021</a:t>
+              <a:t>07-12-2021</a:t>
             </a:fld>
             <a:endParaRPr lang="sv-FI"/>
           </a:p>
@@ -2393,7 +2398,7 @@
           <a:p>
             <a:fld id="{1FA95016-962F-486B-9A5C-BEFA49183FF1}" type="datetimeFigureOut">
               <a:rPr lang="sv-FI" smtClean="0"/>
-              <a:t>31-10-2021</a:t>
+              <a:t>07-12-2021</a:t>
             </a:fld>
             <a:endParaRPr lang="sv-FI"/>
           </a:p>
@@ -2682,7 +2687,7 @@
           <a:p>
             <a:fld id="{1FA95016-962F-486B-9A5C-BEFA49183FF1}" type="datetimeFigureOut">
               <a:rPr lang="sv-FI" smtClean="0"/>
-              <a:t>31-10-2021</a:t>
+              <a:t>07-12-2021</a:t>
             </a:fld>
             <a:endParaRPr lang="sv-FI"/>
           </a:p>
@@ -2925,7 +2930,7 @@
           <a:p>
             <a:fld id="{1FA95016-962F-486B-9A5C-BEFA49183FF1}" type="datetimeFigureOut">
               <a:rPr lang="sv-FI" smtClean="0"/>
-              <a:t>31-10-2021</a:t>
+              <a:t>07-12-2021</a:t>
             </a:fld>
             <a:endParaRPr lang="sv-FI"/>
           </a:p>
@@ -3633,6 +3638,546 @@
           </p:spPr>
         </p:pic>
       </p:grpSp>
+      <p:pic>
+        <p:nvPicPr>
+          <p:cNvPr id="11" name="Bildobjekt 10">
+            <a:extLst>
+              <a:ext uri="{FF2B5EF4-FFF2-40B4-BE49-F238E27FC236}">
+                <a16:creationId xmlns:a16="http://schemas.microsoft.com/office/drawing/2014/main" id="{DA93C151-7F83-4A09-8DC2-9CC790BB5D57}"/>
+              </a:ext>
+            </a:extLst>
+          </p:cNvPr>
+          <p:cNvPicPr>
+            <a:picLocks noChangeAspect="1"/>
+          </p:cNvPicPr>
+          <p:nvPr/>
+        </p:nvPicPr>
+        <p:blipFill>
+          <a:blip r:embed="rId4">
+            <a:extLst>
+              <a:ext uri="{28A0092B-C50C-407E-A947-70E740481C1C}">
+                <a14:useLocalDpi xmlns:a14="http://schemas.microsoft.com/office/drawing/2010/main" val="0"/>
+              </a:ext>
+            </a:extLst>
+          </a:blip>
+          <a:stretch>
+            <a:fillRect/>
+          </a:stretch>
+        </p:blipFill>
+        <p:spPr>
+          <a:xfrm>
+            <a:off x="6439644" y="2791420"/>
+            <a:ext cx="228600" cy="228600"/>
+          </a:xfrm>
+          <a:prstGeom prst="rect">
+            <a:avLst/>
+          </a:prstGeom>
+        </p:spPr>
+      </p:pic>
+      <p:pic>
+        <p:nvPicPr>
+          <p:cNvPr id="13" name="Bildobjekt 12">
+            <a:extLst>
+              <a:ext uri="{FF2B5EF4-FFF2-40B4-BE49-F238E27FC236}">
+                <a16:creationId xmlns:a16="http://schemas.microsoft.com/office/drawing/2014/main" id="{E416701A-425B-43D2-B8EC-A24394B0C8B9}"/>
+              </a:ext>
+            </a:extLst>
+          </p:cNvPr>
+          <p:cNvPicPr>
+            <a:picLocks noChangeAspect="1"/>
+          </p:cNvPicPr>
+          <p:nvPr/>
+        </p:nvPicPr>
+        <p:blipFill>
+          <a:blip r:embed="rId5">
+            <a:extLst>
+              <a:ext uri="{28A0092B-C50C-407E-A947-70E740481C1C}">
+                <a14:useLocalDpi xmlns:a14="http://schemas.microsoft.com/office/drawing/2010/main" val="0"/>
+              </a:ext>
+            </a:extLst>
+          </a:blip>
+          <a:stretch>
+            <a:fillRect/>
+          </a:stretch>
+        </p:blipFill>
+        <p:spPr>
+          <a:xfrm>
+            <a:off x="6743778" y="2693425"/>
+            <a:ext cx="228600" cy="228600"/>
+          </a:xfrm>
+          <a:prstGeom prst="rect">
+            <a:avLst/>
+          </a:prstGeom>
+        </p:spPr>
+      </p:pic>
+      <p:pic>
+        <p:nvPicPr>
+          <p:cNvPr id="15" name="Bildobjekt 14">
+            <a:extLst>
+              <a:ext uri="{FF2B5EF4-FFF2-40B4-BE49-F238E27FC236}">
+                <a16:creationId xmlns:a16="http://schemas.microsoft.com/office/drawing/2014/main" id="{EA447600-6A90-428C-B043-4FC67B562A9F}"/>
+              </a:ext>
+            </a:extLst>
+          </p:cNvPr>
+          <p:cNvPicPr>
+            <a:picLocks noChangeAspect="1"/>
+          </p:cNvPicPr>
+          <p:nvPr/>
+        </p:nvPicPr>
+        <p:blipFill>
+          <a:blip r:embed="rId6">
+            <a:extLst>
+              <a:ext uri="{28A0092B-C50C-407E-A947-70E740481C1C}">
+                <a14:useLocalDpi xmlns:a14="http://schemas.microsoft.com/office/drawing/2010/main" val="0"/>
+              </a:ext>
+            </a:extLst>
+          </a:blip>
+          <a:stretch>
+            <a:fillRect/>
+          </a:stretch>
+        </p:blipFill>
+        <p:spPr>
+          <a:xfrm>
+            <a:off x="7789481" y="3027161"/>
+            <a:ext cx="228600" cy="228600"/>
+          </a:xfrm>
+          <a:prstGeom prst="rect">
+            <a:avLst/>
+          </a:prstGeom>
+        </p:spPr>
+      </p:pic>
+      <p:pic>
+        <p:nvPicPr>
+          <p:cNvPr id="18" name="Bildobjekt 17">
+            <a:extLst>
+              <a:ext uri="{FF2B5EF4-FFF2-40B4-BE49-F238E27FC236}">
+                <a16:creationId xmlns:a16="http://schemas.microsoft.com/office/drawing/2014/main" id="{AF1EBF76-0D2B-4FEF-A6F2-90A23D74EB73}"/>
+              </a:ext>
+            </a:extLst>
+          </p:cNvPr>
+          <p:cNvPicPr>
+            <a:picLocks noChangeAspect="1"/>
+          </p:cNvPicPr>
+          <p:nvPr/>
+        </p:nvPicPr>
+        <p:blipFill>
+          <a:blip r:embed="rId7">
+            <a:extLst>
+              <a:ext uri="{28A0092B-C50C-407E-A947-70E740481C1C}">
+                <a14:useLocalDpi xmlns:a14="http://schemas.microsoft.com/office/drawing/2010/main" val="0"/>
+              </a:ext>
+            </a:extLst>
+          </a:blip>
+          <a:stretch>
+            <a:fillRect/>
+          </a:stretch>
+        </p:blipFill>
+        <p:spPr>
+          <a:xfrm>
+            <a:off x="7618102" y="3207713"/>
+            <a:ext cx="228600" cy="228600"/>
+          </a:xfrm>
+          <a:prstGeom prst="rect">
+            <a:avLst/>
+          </a:prstGeom>
+        </p:spPr>
+      </p:pic>
+      <p:pic>
+        <p:nvPicPr>
+          <p:cNvPr id="20" name="Bildobjekt 19">
+            <a:extLst>
+              <a:ext uri="{FF2B5EF4-FFF2-40B4-BE49-F238E27FC236}">
+                <a16:creationId xmlns:a16="http://schemas.microsoft.com/office/drawing/2014/main" id="{733D81E6-9C73-4FA8-A9AA-3216FFAED996}"/>
+              </a:ext>
+            </a:extLst>
+          </p:cNvPr>
+          <p:cNvPicPr>
+            <a:picLocks noChangeAspect="1"/>
+          </p:cNvPicPr>
+          <p:nvPr/>
+        </p:nvPicPr>
+        <p:blipFill>
+          <a:blip r:embed="rId8">
+            <a:extLst>
+              <a:ext uri="{28A0092B-C50C-407E-A947-70E740481C1C}">
+                <a14:useLocalDpi xmlns:a14="http://schemas.microsoft.com/office/drawing/2010/main" val="0"/>
+              </a:ext>
+            </a:extLst>
+          </a:blip>
+          <a:stretch>
+            <a:fillRect/>
+          </a:stretch>
+        </p:blipFill>
+        <p:spPr>
+          <a:xfrm>
+            <a:off x="7263791" y="3250415"/>
+            <a:ext cx="228600" cy="228600"/>
+          </a:xfrm>
+          <a:prstGeom prst="rect">
+            <a:avLst/>
+          </a:prstGeom>
+        </p:spPr>
+      </p:pic>
+      <p:pic>
+        <p:nvPicPr>
+          <p:cNvPr id="26" name="Bildobjekt 25">
+            <a:extLst>
+              <a:ext uri="{FF2B5EF4-FFF2-40B4-BE49-F238E27FC236}">
+                <a16:creationId xmlns:a16="http://schemas.microsoft.com/office/drawing/2014/main" id="{7EB6EC7D-5B95-4BE5-B7AB-9CEB7C6449FD}"/>
+              </a:ext>
+            </a:extLst>
+          </p:cNvPr>
+          <p:cNvPicPr>
+            <a:picLocks noChangeAspect="1"/>
+          </p:cNvPicPr>
+          <p:nvPr/>
+        </p:nvPicPr>
+        <p:blipFill>
+          <a:blip r:embed="rId9">
+            <a:extLst>
+              <a:ext uri="{28A0092B-C50C-407E-A947-70E740481C1C}">
+                <a14:useLocalDpi xmlns:a14="http://schemas.microsoft.com/office/drawing/2010/main" val="0"/>
+              </a:ext>
+            </a:extLst>
+          </a:blip>
+          <a:stretch>
+            <a:fillRect/>
+          </a:stretch>
+        </p:blipFill>
+        <p:spPr>
+          <a:xfrm>
+            <a:off x="7276513" y="2743654"/>
+            <a:ext cx="228600" cy="228600"/>
+          </a:xfrm>
+          <a:prstGeom prst="rect">
+            <a:avLst/>
+          </a:prstGeom>
+        </p:spPr>
+      </p:pic>
+      <p:pic>
+        <p:nvPicPr>
+          <p:cNvPr id="28" name="Bildobjekt 27">
+            <a:extLst>
+              <a:ext uri="{FF2B5EF4-FFF2-40B4-BE49-F238E27FC236}">
+                <a16:creationId xmlns:a16="http://schemas.microsoft.com/office/drawing/2014/main" id="{D20716A4-C449-47F2-B5B7-D9F6EA63BC12}"/>
+              </a:ext>
+            </a:extLst>
+          </p:cNvPr>
+          <p:cNvPicPr>
+            <a:picLocks noChangeAspect="1"/>
+          </p:cNvPicPr>
+          <p:nvPr/>
+        </p:nvPicPr>
+        <p:blipFill>
+          <a:blip r:embed="rId10">
+            <a:extLst>
+              <a:ext uri="{28A0092B-C50C-407E-A947-70E740481C1C}">
+                <a14:useLocalDpi xmlns:a14="http://schemas.microsoft.com/office/drawing/2010/main" val="0"/>
+              </a:ext>
+            </a:extLst>
+          </a:blip>
+          <a:stretch>
+            <a:fillRect/>
+          </a:stretch>
+        </p:blipFill>
+        <p:spPr>
+          <a:xfrm>
+            <a:off x="7538059" y="2743654"/>
+            <a:ext cx="228600" cy="228600"/>
+          </a:xfrm>
+          <a:prstGeom prst="rect">
+            <a:avLst/>
+          </a:prstGeom>
+        </p:spPr>
+      </p:pic>
+      <p:pic>
+        <p:nvPicPr>
+          <p:cNvPr id="31" name="Bildobjekt 30">
+            <a:extLst>
+              <a:ext uri="{FF2B5EF4-FFF2-40B4-BE49-F238E27FC236}">
+                <a16:creationId xmlns:a16="http://schemas.microsoft.com/office/drawing/2014/main" id="{77428135-4E5B-41EB-B490-84526566B392}"/>
+              </a:ext>
+            </a:extLst>
+          </p:cNvPr>
+          <p:cNvPicPr>
+            <a:picLocks noChangeAspect="1"/>
+          </p:cNvPicPr>
+          <p:nvPr/>
+        </p:nvPicPr>
+        <p:blipFill>
+          <a:blip r:embed="rId11">
+            <a:extLst>
+              <a:ext uri="{28A0092B-C50C-407E-A947-70E740481C1C}">
+                <a14:useLocalDpi xmlns:a14="http://schemas.microsoft.com/office/drawing/2010/main" val="0"/>
+              </a:ext>
+            </a:extLst>
+          </a:blip>
+          <a:stretch>
+            <a:fillRect/>
+          </a:stretch>
+        </p:blipFill>
+        <p:spPr>
+          <a:xfrm>
+            <a:off x="7312075" y="3007260"/>
+            <a:ext cx="228600" cy="228600"/>
+          </a:xfrm>
+          <a:prstGeom prst="rect">
+            <a:avLst/>
+          </a:prstGeom>
+        </p:spPr>
+      </p:pic>
+      <p:pic>
+        <p:nvPicPr>
+          <p:cNvPr id="36" name="Bildobjekt 35">
+            <a:extLst>
+              <a:ext uri="{FF2B5EF4-FFF2-40B4-BE49-F238E27FC236}">
+                <a16:creationId xmlns:a16="http://schemas.microsoft.com/office/drawing/2014/main" id="{72F8E88B-BFE3-49AF-B44E-F333C2CAF5C7}"/>
+              </a:ext>
+            </a:extLst>
+          </p:cNvPr>
+          <p:cNvPicPr>
+            <a:picLocks noChangeAspect="1"/>
+          </p:cNvPicPr>
+          <p:nvPr/>
+        </p:nvPicPr>
+        <p:blipFill>
+          <a:blip r:embed="rId12">
+            <a:extLst>
+              <a:ext uri="{28A0092B-C50C-407E-A947-70E740481C1C}">
+                <a14:useLocalDpi xmlns:a14="http://schemas.microsoft.com/office/drawing/2010/main" val="0"/>
+              </a:ext>
+            </a:extLst>
+          </a:blip>
+          <a:stretch>
+            <a:fillRect/>
+          </a:stretch>
+        </p:blipFill>
+        <p:spPr>
+          <a:xfrm>
+            <a:off x="7704703" y="1499731"/>
+            <a:ext cx="228600" cy="228600"/>
+          </a:xfrm>
+          <a:prstGeom prst="rect">
+            <a:avLst/>
+          </a:prstGeom>
+        </p:spPr>
+      </p:pic>
+      <p:pic>
+        <p:nvPicPr>
+          <p:cNvPr id="38" name="Bildobjekt 37">
+            <a:extLst>
+              <a:ext uri="{FF2B5EF4-FFF2-40B4-BE49-F238E27FC236}">
+                <a16:creationId xmlns:a16="http://schemas.microsoft.com/office/drawing/2014/main" id="{B5CEC547-9407-4683-B1DB-32328E311F94}"/>
+              </a:ext>
+            </a:extLst>
+          </p:cNvPr>
+          <p:cNvPicPr>
+            <a:picLocks noChangeAspect="1"/>
+          </p:cNvPicPr>
+          <p:nvPr/>
+        </p:nvPicPr>
+        <p:blipFill>
+          <a:blip r:embed="rId13">
+            <a:extLst>
+              <a:ext uri="{28A0092B-C50C-407E-A947-70E740481C1C}">
+                <a14:useLocalDpi xmlns:a14="http://schemas.microsoft.com/office/drawing/2010/main" val="0"/>
+              </a:ext>
+            </a:extLst>
+          </a:blip>
+          <a:stretch>
+            <a:fillRect/>
+          </a:stretch>
+        </p:blipFill>
+        <p:spPr>
+          <a:xfrm>
+            <a:off x="7035191" y="1803205"/>
+            <a:ext cx="228600" cy="228600"/>
+          </a:xfrm>
+          <a:prstGeom prst="rect">
+            <a:avLst/>
+          </a:prstGeom>
+        </p:spPr>
+      </p:pic>
+      <p:pic>
+        <p:nvPicPr>
+          <p:cNvPr id="42" name="Bildobjekt 41">
+            <a:extLst>
+              <a:ext uri="{FF2B5EF4-FFF2-40B4-BE49-F238E27FC236}">
+                <a16:creationId xmlns:a16="http://schemas.microsoft.com/office/drawing/2014/main" id="{9FB313DC-F455-4F6D-A56B-FC4F500A57FB}"/>
+              </a:ext>
+            </a:extLst>
+          </p:cNvPr>
+          <p:cNvPicPr>
+            <a:picLocks noChangeAspect="1"/>
+          </p:cNvPicPr>
+          <p:nvPr/>
+        </p:nvPicPr>
+        <p:blipFill>
+          <a:blip r:embed="rId14">
+            <a:extLst>
+              <a:ext uri="{28A0092B-C50C-407E-A947-70E740481C1C}">
+                <a14:useLocalDpi xmlns:a14="http://schemas.microsoft.com/office/drawing/2010/main" val="0"/>
+              </a:ext>
+            </a:extLst>
+          </a:blip>
+          <a:stretch>
+            <a:fillRect/>
+          </a:stretch>
+        </p:blipFill>
+        <p:spPr>
+          <a:xfrm>
+            <a:off x="7423759" y="1709519"/>
+            <a:ext cx="228600" cy="228600"/>
+          </a:xfrm>
+          <a:prstGeom prst="rect">
+            <a:avLst/>
+          </a:prstGeom>
+        </p:spPr>
+      </p:pic>
+      <p:pic>
+        <p:nvPicPr>
+          <p:cNvPr id="44" name="Bildobjekt 43">
+            <a:extLst>
+              <a:ext uri="{FF2B5EF4-FFF2-40B4-BE49-F238E27FC236}">
+                <a16:creationId xmlns:a16="http://schemas.microsoft.com/office/drawing/2014/main" id="{5016AC85-5E6D-4EBD-B732-4AF459756D03}"/>
+              </a:ext>
+            </a:extLst>
+          </p:cNvPr>
+          <p:cNvPicPr>
+            <a:picLocks noChangeAspect="1"/>
+          </p:cNvPicPr>
+          <p:nvPr/>
+        </p:nvPicPr>
+        <p:blipFill>
+          <a:blip r:embed="rId15">
+            <a:extLst>
+              <a:ext uri="{28A0092B-C50C-407E-A947-70E740481C1C}">
+                <a14:useLocalDpi xmlns:a14="http://schemas.microsoft.com/office/drawing/2010/main" val="0"/>
+              </a:ext>
+            </a:extLst>
+          </a:blip>
+          <a:stretch>
+            <a:fillRect/>
+          </a:stretch>
+        </p:blipFill>
+        <p:spPr>
+          <a:xfrm>
+            <a:off x="7047913" y="1410744"/>
+            <a:ext cx="228600" cy="228600"/>
+          </a:xfrm>
+          <a:prstGeom prst="rect">
+            <a:avLst/>
+          </a:prstGeom>
+        </p:spPr>
+      </p:pic>
+      <p:pic>
+        <p:nvPicPr>
+          <p:cNvPr id="46" name="Bildobjekt 45">
+            <a:extLst>
+              <a:ext uri="{FF2B5EF4-FFF2-40B4-BE49-F238E27FC236}">
+                <a16:creationId xmlns:a16="http://schemas.microsoft.com/office/drawing/2014/main" id="{F06B4BA8-5A49-462D-8DFD-9AE280DD3702}"/>
+              </a:ext>
+            </a:extLst>
+          </p:cNvPr>
+          <p:cNvPicPr>
+            <a:picLocks noChangeAspect="1"/>
+          </p:cNvPicPr>
+          <p:nvPr/>
+        </p:nvPicPr>
+        <p:blipFill>
+          <a:blip r:embed="rId16">
+            <a:extLst>
+              <a:ext uri="{28A0092B-C50C-407E-A947-70E740481C1C}">
+                <a14:useLocalDpi xmlns:a14="http://schemas.microsoft.com/office/drawing/2010/main" val="0"/>
+              </a:ext>
+            </a:extLst>
+          </a:blip>
+          <a:stretch>
+            <a:fillRect/>
+          </a:stretch>
+        </p:blipFill>
+        <p:spPr>
+          <a:xfrm>
+            <a:off x="6743778" y="1341850"/>
+            <a:ext cx="228600" cy="228600"/>
+          </a:xfrm>
+          <a:prstGeom prst="rect">
+            <a:avLst/>
+          </a:prstGeom>
+        </p:spPr>
+      </p:pic>
+      <p:pic>
+        <p:nvPicPr>
+          <p:cNvPr id="48" name="Bildobjekt 47">
+            <a:extLst>
+              <a:ext uri="{FF2B5EF4-FFF2-40B4-BE49-F238E27FC236}">
+                <a16:creationId xmlns:a16="http://schemas.microsoft.com/office/drawing/2014/main" id="{A6F606DF-2BB3-4C61-BBE3-ADC9FCCD2107}"/>
+              </a:ext>
+            </a:extLst>
+          </p:cNvPr>
+          <p:cNvPicPr>
+            <a:picLocks noChangeAspect="1"/>
+          </p:cNvPicPr>
+          <p:nvPr/>
+        </p:nvPicPr>
+        <p:blipFill>
+          <a:blip r:embed="rId17">
+            <a:extLst>
+              <a:ext uri="{28A0092B-C50C-407E-A947-70E740481C1C}">
+                <a14:useLocalDpi xmlns:a14="http://schemas.microsoft.com/office/drawing/2010/main" val="0"/>
+              </a:ext>
+            </a:extLst>
+          </a:blip>
+          <a:stretch>
+            <a:fillRect/>
+          </a:stretch>
+        </p:blipFill>
+        <p:spPr>
+          <a:xfrm>
+            <a:off x="6519030" y="1341850"/>
+            <a:ext cx="228600" cy="228600"/>
+          </a:xfrm>
+          <a:prstGeom prst="rect">
+            <a:avLst/>
+          </a:prstGeom>
+        </p:spPr>
+      </p:pic>
+      <p:pic>
+        <p:nvPicPr>
+          <p:cNvPr id="50" name="Bildobjekt 49">
+            <a:extLst>
+              <a:ext uri="{FF2B5EF4-FFF2-40B4-BE49-F238E27FC236}">
+                <a16:creationId xmlns:a16="http://schemas.microsoft.com/office/drawing/2014/main" id="{24650103-A94E-488F-85B3-73F1427B4409}"/>
+              </a:ext>
+            </a:extLst>
+          </p:cNvPr>
+          <p:cNvPicPr>
+            <a:picLocks noChangeAspect="1"/>
+          </p:cNvPicPr>
+          <p:nvPr/>
+        </p:nvPicPr>
+        <p:blipFill>
+          <a:blip r:embed="rId18">
+            <a:extLst>
+              <a:ext uri="{28A0092B-C50C-407E-A947-70E740481C1C}">
+                <a14:useLocalDpi xmlns:a14="http://schemas.microsoft.com/office/drawing/2010/main" val="0"/>
+              </a:ext>
+            </a:extLst>
+          </a:blip>
+          <a:stretch>
+            <a:fillRect/>
+          </a:stretch>
+        </p:blipFill>
+        <p:spPr>
+          <a:xfrm>
+            <a:off x="7511817" y="1296444"/>
+            <a:ext cx="228600" cy="228600"/>
+          </a:xfrm>
+          <a:prstGeom prst="rect">
+            <a:avLst/>
+          </a:prstGeom>
+        </p:spPr>
+      </p:pic>
     </p:spTree>
     <p:extLst>
       <p:ext uri="{BB962C8B-B14F-4D97-AF65-F5344CB8AC3E}">

</xml_diff>

<commit_message>
Add button to toolbar for creating new test case
Create Icon
</commit_message>
<xml_diff>
--- a/docs/Style/Icon Graphics.pptx
+++ b/docs/Style/Icon Graphics.pptx
@@ -261,7 +261,7 @@
           <a:p>
             <a:fld id="{1FA95016-962F-486B-9A5C-BEFA49183FF1}" type="datetimeFigureOut">
               <a:rPr lang="sv-FI" smtClean="0"/>
-              <a:t>07-12-2021</a:t>
+              <a:t>13-05-2022</a:t>
             </a:fld>
             <a:endParaRPr lang="sv-FI"/>
           </a:p>
@@ -461,7 +461,7 @@
           <a:p>
             <a:fld id="{1FA95016-962F-486B-9A5C-BEFA49183FF1}" type="datetimeFigureOut">
               <a:rPr lang="sv-FI" smtClean="0"/>
-              <a:t>07-12-2021</a:t>
+              <a:t>13-05-2022</a:t>
             </a:fld>
             <a:endParaRPr lang="sv-FI"/>
           </a:p>
@@ -671,7 +671,7 @@
           <a:p>
             <a:fld id="{1FA95016-962F-486B-9A5C-BEFA49183FF1}" type="datetimeFigureOut">
               <a:rPr lang="sv-FI" smtClean="0"/>
-              <a:t>07-12-2021</a:t>
+              <a:t>13-05-2022</a:t>
             </a:fld>
             <a:endParaRPr lang="sv-FI"/>
           </a:p>
@@ -871,7 +871,7 @@
           <a:p>
             <a:fld id="{1FA95016-962F-486B-9A5C-BEFA49183FF1}" type="datetimeFigureOut">
               <a:rPr lang="sv-FI" smtClean="0"/>
-              <a:t>07-12-2021</a:t>
+              <a:t>13-05-2022</a:t>
             </a:fld>
             <a:endParaRPr lang="sv-FI"/>
           </a:p>
@@ -1147,7 +1147,7 @@
           <a:p>
             <a:fld id="{1FA95016-962F-486B-9A5C-BEFA49183FF1}" type="datetimeFigureOut">
               <a:rPr lang="sv-FI" smtClean="0"/>
-              <a:t>07-12-2021</a:t>
+              <a:t>13-05-2022</a:t>
             </a:fld>
             <a:endParaRPr lang="sv-FI"/>
           </a:p>
@@ -1415,7 +1415,7 @@
           <a:p>
             <a:fld id="{1FA95016-962F-486B-9A5C-BEFA49183FF1}" type="datetimeFigureOut">
               <a:rPr lang="sv-FI" smtClean="0"/>
-              <a:t>07-12-2021</a:t>
+              <a:t>13-05-2022</a:t>
             </a:fld>
             <a:endParaRPr lang="sv-FI"/>
           </a:p>
@@ -1830,7 +1830,7 @@
           <a:p>
             <a:fld id="{1FA95016-962F-486B-9A5C-BEFA49183FF1}" type="datetimeFigureOut">
               <a:rPr lang="sv-FI" smtClean="0"/>
-              <a:t>07-12-2021</a:t>
+              <a:t>13-05-2022</a:t>
             </a:fld>
             <a:endParaRPr lang="sv-FI"/>
           </a:p>
@@ -1972,7 +1972,7 @@
           <a:p>
             <a:fld id="{1FA95016-962F-486B-9A5C-BEFA49183FF1}" type="datetimeFigureOut">
               <a:rPr lang="sv-FI" smtClean="0"/>
-              <a:t>07-12-2021</a:t>
+              <a:t>13-05-2022</a:t>
             </a:fld>
             <a:endParaRPr lang="sv-FI"/>
           </a:p>
@@ -2085,7 +2085,7 @@
           <a:p>
             <a:fld id="{1FA95016-962F-486B-9A5C-BEFA49183FF1}" type="datetimeFigureOut">
               <a:rPr lang="sv-FI" smtClean="0"/>
-              <a:t>07-12-2021</a:t>
+              <a:t>13-05-2022</a:t>
             </a:fld>
             <a:endParaRPr lang="sv-FI"/>
           </a:p>
@@ -2398,7 +2398,7 @@
           <a:p>
             <a:fld id="{1FA95016-962F-486B-9A5C-BEFA49183FF1}" type="datetimeFigureOut">
               <a:rPr lang="sv-FI" smtClean="0"/>
-              <a:t>07-12-2021</a:t>
+              <a:t>13-05-2022</a:t>
             </a:fld>
             <a:endParaRPr lang="sv-FI"/>
           </a:p>
@@ -2687,7 +2687,7 @@
           <a:p>
             <a:fld id="{1FA95016-962F-486B-9A5C-BEFA49183FF1}" type="datetimeFigureOut">
               <a:rPr lang="sv-FI" smtClean="0"/>
-              <a:t>07-12-2021</a:t>
+              <a:t>13-05-2022</a:t>
             </a:fld>
             <a:endParaRPr lang="sv-FI"/>
           </a:p>
@@ -2930,7 +2930,7 @@
           <a:p>
             <a:fld id="{1FA95016-962F-486B-9A5C-BEFA49183FF1}" type="datetimeFigureOut">
               <a:rPr lang="sv-FI" smtClean="0"/>
-              <a:t>07-12-2021</a:t>
+              <a:t>13-05-2022</a:t>
             </a:fld>
             <a:endParaRPr lang="sv-FI"/>
           </a:p>
@@ -4178,6 +4178,150 @@
           </a:prstGeom>
         </p:spPr>
       </p:pic>
+      <p:pic>
+        <p:nvPicPr>
+          <p:cNvPr id="3" name="Bildobjekt 2">
+            <a:extLst>
+              <a:ext uri="{FF2B5EF4-FFF2-40B4-BE49-F238E27FC236}">
+                <a16:creationId xmlns:a16="http://schemas.microsoft.com/office/drawing/2014/main" id="{950AF56D-40F3-796C-0E99-0227AE1327E5}"/>
+              </a:ext>
+            </a:extLst>
+          </p:cNvPr>
+          <p:cNvPicPr>
+            <a:picLocks noChangeAspect="1"/>
+          </p:cNvPicPr>
+          <p:nvPr/>
+        </p:nvPicPr>
+        <p:blipFill>
+          <a:blip r:embed="rId19">
+            <a:extLst>
+              <a:ext uri="{28A0092B-C50C-407E-A947-70E740481C1C}">
+                <a14:useLocalDpi xmlns:a14="http://schemas.microsoft.com/office/drawing/2010/main" val="0"/>
+              </a:ext>
+            </a:extLst>
+          </a:blip>
+          <a:stretch>
+            <a:fillRect/>
+          </a:stretch>
+        </p:blipFill>
+        <p:spPr>
+          <a:xfrm>
+            <a:off x="6647259" y="2939505"/>
+            <a:ext cx="228600" cy="228600"/>
+          </a:xfrm>
+          <a:prstGeom prst="rect">
+            <a:avLst/>
+          </a:prstGeom>
+        </p:spPr>
+      </p:pic>
+      <p:pic>
+        <p:nvPicPr>
+          <p:cNvPr id="5" name="Bildobjekt 4">
+            <a:extLst>
+              <a:ext uri="{FF2B5EF4-FFF2-40B4-BE49-F238E27FC236}">
+                <a16:creationId xmlns:a16="http://schemas.microsoft.com/office/drawing/2014/main" id="{1A6F9783-767D-9F22-429C-E6D2A53D4480}"/>
+              </a:ext>
+            </a:extLst>
+          </p:cNvPr>
+          <p:cNvPicPr>
+            <a:picLocks noChangeAspect="1"/>
+          </p:cNvPicPr>
+          <p:nvPr/>
+        </p:nvPicPr>
+        <p:blipFill>
+          <a:blip r:embed="rId20">
+            <a:extLst>
+              <a:ext uri="{28A0092B-C50C-407E-A947-70E740481C1C}">
+                <a14:useLocalDpi xmlns:a14="http://schemas.microsoft.com/office/drawing/2010/main" val="0"/>
+              </a:ext>
+            </a:extLst>
+          </a:blip>
+          <a:stretch>
+            <a:fillRect/>
+          </a:stretch>
+        </p:blipFill>
+        <p:spPr>
+          <a:xfrm>
+            <a:off x="6657302" y="3250415"/>
+            <a:ext cx="228600" cy="228600"/>
+          </a:xfrm>
+          <a:prstGeom prst="rect">
+            <a:avLst/>
+          </a:prstGeom>
+        </p:spPr>
+      </p:pic>
+      <p:pic>
+        <p:nvPicPr>
+          <p:cNvPr id="9" name="Bildobjekt 8">
+            <a:extLst>
+              <a:ext uri="{FF2B5EF4-FFF2-40B4-BE49-F238E27FC236}">
+                <a16:creationId xmlns:a16="http://schemas.microsoft.com/office/drawing/2014/main" id="{8B6E26CE-6A16-6474-8CC2-B5839FB49E54}"/>
+              </a:ext>
+            </a:extLst>
+          </p:cNvPr>
+          <p:cNvPicPr>
+            <a:picLocks noChangeAspect="1"/>
+          </p:cNvPicPr>
+          <p:nvPr/>
+        </p:nvPicPr>
+        <p:blipFill>
+          <a:blip r:embed="rId21">
+            <a:extLst>
+              <a:ext uri="{28A0092B-C50C-407E-A947-70E740481C1C}">
+                <a14:useLocalDpi xmlns:a14="http://schemas.microsoft.com/office/drawing/2010/main" val="0"/>
+              </a:ext>
+            </a:extLst>
+          </a:blip>
+          <a:stretch>
+            <a:fillRect/>
+          </a:stretch>
+        </p:blipFill>
+        <p:spPr>
+          <a:xfrm>
+            <a:off x="6515976" y="3575596"/>
+            <a:ext cx="228600" cy="228600"/>
+          </a:xfrm>
+          <a:prstGeom prst="rect">
+            <a:avLst/>
+          </a:prstGeom>
+        </p:spPr>
+      </p:pic>
+      <p:pic>
+        <p:nvPicPr>
+          <p:cNvPr id="12" name="Bildobjekt 11">
+            <a:extLst>
+              <a:ext uri="{FF2B5EF4-FFF2-40B4-BE49-F238E27FC236}">
+                <a16:creationId xmlns:a16="http://schemas.microsoft.com/office/drawing/2014/main" id="{B0601922-BBA2-6777-2B27-F2F810775204}"/>
+              </a:ext>
+            </a:extLst>
+          </p:cNvPr>
+          <p:cNvPicPr>
+            <a:picLocks noChangeAspect="1"/>
+          </p:cNvPicPr>
+          <p:nvPr/>
+        </p:nvPicPr>
+        <p:blipFill>
+          <a:blip r:embed="rId22">
+            <a:extLst>
+              <a:ext uri="{28A0092B-C50C-407E-A947-70E740481C1C}">
+                <a14:useLocalDpi xmlns:a14="http://schemas.microsoft.com/office/drawing/2010/main" val="0"/>
+              </a:ext>
+            </a:extLst>
+          </a:blip>
+          <a:stretch>
+            <a:fillRect/>
+          </a:stretch>
+        </p:blipFill>
+        <p:spPr>
+          <a:xfrm>
+            <a:off x="6624793" y="3679097"/>
+            <a:ext cx="228600" cy="228600"/>
+          </a:xfrm>
+          <a:prstGeom prst="rect">
+            <a:avLst/>
+          </a:prstGeom>
+        </p:spPr>
+      </p:pic>
     </p:spTree>
     <p:extLst>
       <p:ext uri="{BB962C8B-B14F-4D97-AF65-F5344CB8AC3E}">

</xml_diff>